<commit_message>
Update scale to 16:9
</commit_message>
<xml_diff>
--- a/66信心.pptx
+++ b/66信心.pptx
@@ -9,11 +9,10 @@
     <p:sldId id="257" r:id="rId3"/>
     <p:sldId id="258" r:id="rId4"/>
     <p:sldId id="259" r:id="rId5"/>
-    <p:sldId id="260" r:id="rId6"/>
-    <p:sldId id="261" r:id="rId7"/>
-    <p:sldId id="262" r:id="rId8"/>
+    <p:sldId id="261" r:id="rId6"/>
+    <p:sldId id="262" r:id="rId7"/>
   </p:sldIdLst>
-  <p:sldSz cx="9144000" cy="6858000" type="screen4x3"/>
+  <p:sldSz cx="9144000" cy="5143500" type="screen16x9"/>
   <p:notesSz cx="6858000" cy="9144000"/>
   <p:defaultTextStyle>
     <a:defPPr>
@@ -147,8 +146,8 @@
         </p:nvSpPr>
         <p:spPr>
           <a:xfrm>
-            <a:off x="2286000" y="3124200"/>
-            <a:ext cx="6172200" cy="1894362"/>
+            <a:off x="2286000" y="2343150"/>
+            <a:ext cx="6172200" cy="1420772"/>
           </a:xfrm>
         </p:spPr>
         <p:txBody>
@@ -179,8 +178,8 @@
         </p:nvSpPr>
         <p:spPr>
           <a:xfrm>
-            <a:off x="2286000" y="5003322"/>
-            <a:ext cx="6172200" cy="1371600"/>
+            <a:off x="2286000" y="3752492"/>
+            <a:ext cx="6172200" cy="1028700"/>
           </a:xfrm>
         </p:spPr>
         <p:txBody>
@@ -240,8 +239,8 @@
         </p:nvSpPr>
         <p:spPr bwMode="auto">
           <a:xfrm rot="5400000">
-            <a:off x="7764621" y="1174097"/>
-            <a:ext cx="2286000" cy="381000"/>
+            <a:off x="8050371" y="832948"/>
+            <a:ext cx="1714500" cy="381000"/>
           </a:xfrm>
         </p:spPr>
         <p:txBody>
@@ -251,7 +250,7 @@
             <a:fld id="{74BC4726-2204-402F-8651-3DE2807316DF}" type="datetimeFigureOut">
               <a:rPr lang="en-US" smtClean="0"/>
               <a:pPr/>
-              <a:t>6/1/2018</a:t>
+              <a:t>7/13/2019</a:t>
             </a:fld>
             <a:endParaRPr lang="en-US"/>
           </a:p>
@@ -269,8 +268,8 @@
         </p:nvSpPr>
         <p:spPr bwMode="auto">
           <a:xfrm rot="5400000">
-            <a:off x="7077269" y="4181669"/>
-            <a:ext cx="3657600" cy="384048"/>
+            <a:off x="7534469" y="3088246"/>
+            <a:ext cx="2743200" cy="384048"/>
           </a:xfrm>
         </p:spPr>
         <p:txBody>
@@ -290,7 +289,7 @@
         <p:spPr bwMode="auto">
           <a:xfrm>
             <a:off x="381000" y="0"/>
-            <a:ext cx="609600" cy="6858000"/>
+            <a:ext cx="609600" cy="5143500"/>
           </a:xfrm>
           <a:prstGeom prst="rect">
             <a:avLst/>
@@ -339,7 +338,7 @@
         <p:spPr bwMode="auto">
           <a:xfrm>
             <a:off x="276336" y="0"/>
-            <a:ext cx="104664" cy="6858000"/>
+            <a:ext cx="104664" cy="5143500"/>
           </a:xfrm>
           <a:prstGeom prst="rect">
             <a:avLst/>
@@ -388,7 +387,7 @@
         <p:spPr bwMode="auto">
           <a:xfrm>
             <a:off x="990600" y="0"/>
-            <a:ext cx="181872" cy="6858000"/>
+            <a:ext cx="181872" cy="5143500"/>
           </a:xfrm>
           <a:prstGeom prst="rect">
             <a:avLst/>
@@ -437,7 +436,7 @@
         <p:spPr bwMode="auto">
           <a:xfrm>
             <a:off x="1141320" y="0"/>
-            <a:ext cx="230280" cy="6858000"/>
+            <a:ext cx="230280" cy="5143500"/>
           </a:xfrm>
           <a:prstGeom prst="rect">
             <a:avLst/>
@@ -488,7 +487,7 @@
         <p:spPr bwMode="auto">
           <a:xfrm>
             <a:off x="106344" y="0"/>
-            <a:ext cx="0" cy="6858000"/>
+            <a:ext cx="0" cy="5143500"/>
           </a:xfrm>
           <a:prstGeom prst="line">
             <a:avLst/>
@@ -527,7 +526,7 @@
         <p:spPr bwMode="auto">
           <a:xfrm>
             <a:off x="914400" y="0"/>
-            <a:ext cx="0" cy="6858000"/>
+            <a:ext cx="0" cy="5143500"/>
           </a:xfrm>
           <a:prstGeom prst="line">
             <a:avLst/>
@@ -566,7 +565,7 @@
         <p:spPr bwMode="auto">
           <a:xfrm>
             <a:off x="854112" y="0"/>
-            <a:ext cx="0" cy="6858000"/>
+            <a:ext cx="0" cy="5143500"/>
           </a:xfrm>
           <a:prstGeom prst="line">
             <a:avLst/>
@@ -604,7 +603,7 @@
         <p:spPr bwMode="auto">
           <a:xfrm>
             <a:off x="1726640" y="0"/>
-            <a:ext cx="0" cy="6858000"/>
+            <a:ext cx="0" cy="5143500"/>
           </a:xfrm>
           <a:prstGeom prst="line">
             <a:avLst/>
@@ -643,7 +642,7 @@
         <p:spPr bwMode="auto">
           <a:xfrm>
             <a:off x="1066800" y="0"/>
-            <a:ext cx="0" cy="6858000"/>
+            <a:ext cx="0" cy="5143500"/>
           </a:xfrm>
           <a:prstGeom prst="line">
             <a:avLst/>
@@ -681,7 +680,7 @@
         <p:spPr bwMode="auto">
           <a:xfrm>
             <a:off x="9113856" y="0"/>
-            <a:ext cx="0" cy="6858000"/>
+            <a:ext cx="0" cy="5143500"/>
           </a:xfrm>
           <a:prstGeom prst="line">
             <a:avLst/>
@@ -717,7 +716,7 @@
         <p:spPr bwMode="auto">
           <a:xfrm>
             <a:off x="1219200" y="0"/>
-            <a:ext cx="76200" cy="6858000"/>
+            <a:ext cx="76200" cy="5143500"/>
           </a:xfrm>
           <a:prstGeom prst="rect">
             <a:avLst/>
@@ -765,8 +764,8 @@
         </p:nvSpPr>
         <p:spPr bwMode="auto">
           <a:xfrm>
-            <a:off x="609600" y="3429000"/>
-            <a:ext cx="1295400" cy="1295400"/>
+            <a:off x="609600" y="2571750"/>
+            <a:ext cx="1295400" cy="971550"/>
           </a:xfrm>
           <a:prstGeom prst="ellipse">
             <a:avLst/>
@@ -811,8 +810,8 @@
         </p:nvSpPr>
         <p:spPr bwMode="auto">
           <a:xfrm>
-            <a:off x="1309632" y="4866752"/>
-            <a:ext cx="641424" cy="641424"/>
+            <a:off x="1309632" y="3650064"/>
+            <a:ext cx="641424" cy="481068"/>
           </a:xfrm>
           <a:prstGeom prst="ellipse">
             <a:avLst/>
@@ -854,8 +853,8 @@
         </p:nvSpPr>
         <p:spPr bwMode="auto">
           <a:xfrm>
-            <a:off x="1091080" y="5500632"/>
-            <a:ext cx="137160" cy="137160"/>
+            <a:off x="1091080" y="4125474"/>
+            <a:ext cx="137160" cy="102870"/>
           </a:xfrm>
           <a:prstGeom prst="ellipse">
             <a:avLst/>
@@ -897,8 +896,8 @@
         </p:nvSpPr>
         <p:spPr bwMode="auto">
           <a:xfrm>
-            <a:off x="1664208" y="5788152"/>
-            <a:ext cx="274320" cy="274320"/>
+            <a:off x="1664208" y="4341114"/>
+            <a:ext cx="274320" cy="205740"/>
           </a:xfrm>
           <a:prstGeom prst="ellipse">
             <a:avLst/>
@@ -940,8 +939,8 @@
         </p:nvSpPr>
         <p:spPr>
           <a:xfrm>
-            <a:off x="1905000" y="4495800"/>
-            <a:ext cx="365760" cy="365760"/>
+            <a:off x="1905000" y="3371850"/>
+            <a:ext cx="365760" cy="274320"/>
           </a:xfrm>
           <a:prstGeom prst="ellipse">
             <a:avLst/>
@@ -987,8 +986,8 @@
         </p:nvSpPr>
         <p:spPr bwMode="auto">
           <a:xfrm>
-            <a:off x="1325544" y="4928702"/>
-            <a:ext cx="609600" cy="517524"/>
+            <a:off x="1325544" y="3696527"/>
+            <a:ext cx="609600" cy="388143"/>
           </a:xfrm>
         </p:spPr>
         <p:txBody>
@@ -1122,7 +1121,7 @@
             <a:fld id="{74BC4726-2204-402F-8651-3DE2807316DF}" type="datetimeFigureOut">
               <a:rPr lang="en-US" smtClean="0"/>
               <a:pPr/>
-              <a:t>6/1/2018</a:t>
+              <a:t>7/13/2019</a:t>
             </a:fld>
             <a:endParaRPr lang="en-US"/>
           </a:p>
@@ -1208,8 +1207,8 @@
         </p:nvSpPr>
         <p:spPr>
           <a:xfrm>
-            <a:off x="6629400" y="274639"/>
-            <a:ext cx="1676400" cy="5851525"/>
+            <a:off x="6629400" y="205980"/>
+            <a:ext cx="1676400" cy="4388644"/>
           </a:xfrm>
         </p:spPr>
         <p:txBody>
@@ -1236,8 +1235,8 @@
         </p:nvSpPr>
         <p:spPr>
           <a:xfrm>
-            <a:off x="457200" y="274638"/>
-            <a:ext cx="6019800" cy="5851525"/>
+            <a:off x="457200" y="205979"/>
+            <a:ext cx="6019800" cy="4388644"/>
           </a:xfrm>
         </p:spPr>
         <p:txBody>
@@ -1299,7 +1298,7 @@
             <a:fld id="{74BC4726-2204-402F-8651-3DE2807316DF}" type="datetimeFigureOut">
               <a:rPr lang="en-US" smtClean="0"/>
               <a:pPr/>
-              <a:t>6/1/2018</a:t>
+              <a:t>7/13/2019</a:t>
             </a:fld>
             <a:endParaRPr lang="en-US"/>
           </a:p>
@@ -1408,8 +1407,8 @@
         </p:nvSpPr>
         <p:spPr>
           <a:xfrm>
-            <a:off x="457200" y="1600200"/>
-            <a:ext cx="7467600" cy="4873752"/>
+            <a:off x="457200" y="1200150"/>
+            <a:ext cx="7467600" cy="3655314"/>
           </a:xfrm>
         </p:spPr>
         <p:txBody>
@@ -1471,7 +1470,7 @@
             <a:fld id="{74BC4726-2204-402F-8651-3DE2807316DF}" type="datetimeFigureOut">
               <a:rPr lang="en-US" smtClean="0"/>
               <a:pPr/>
-              <a:t>6/1/2018</a:t>
+              <a:t>7/13/2019</a:t>
             </a:fld>
             <a:endParaRPr lang="en-US"/>
           </a:p>
@@ -1562,8 +1561,8 @@
         </p:nvSpPr>
         <p:spPr>
           <a:xfrm>
-            <a:off x="2286000" y="2895600"/>
-            <a:ext cx="6172200" cy="2053590"/>
+            <a:off x="2286000" y="2171700"/>
+            <a:ext cx="6172200" cy="1540193"/>
           </a:xfrm>
         </p:spPr>
         <p:txBody>
@@ -1595,8 +1594,8 @@
         </p:nvSpPr>
         <p:spPr>
           <a:xfrm>
-            <a:off x="2286000" y="5010150"/>
-            <a:ext cx="6172200" cy="1371600"/>
+            <a:off x="2286000" y="3757613"/>
+            <a:ext cx="6172200" cy="1028700"/>
           </a:xfrm>
         </p:spPr>
         <p:txBody>
@@ -1672,8 +1671,8 @@
         </p:nvSpPr>
         <p:spPr bwMode="auto">
           <a:xfrm rot="5400000">
-            <a:off x="7763256" y="1170432"/>
-            <a:ext cx="2286000" cy="381000"/>
+            <a:off x="8049006" y="830199"/>
+            <a:ext cx="1714500" cy="381000"/>
           </a:xfrm>
         </p:spPr>
         <p:txBody>
@@ -1683,7 +1682,7 @@
             <a:fld id="{74BC4726-2204-402F-8651-3DE2807316DF}" type="datetimeFigureOut">
               <a:rPr lang="en-US" smtClean="0"/>
               <a:pPr/>
-              <a:t>6/1/2018</a:t>
+              <a:t>7/13/2019</a:t>
             </a:fld>
             <a:endParaRPr lang="en-US"/>
           </a:p>
@@ -1701,8 +1700,8 @@
         </p:nvSpPr>
         <p:spPr bwMode="auto">
           <a:xfrm rot="5400000">
-            <a:off x="7077456" y="4178808"/>
-            <a:ext cx="3657600" cy="384048"/>
+            <a:off x="7534656" y="3086100"/>
+            <a:ext cx="2743200" cy="384048"/>
           </a:xfrm>
         </p:spPr>
         <p:txBody>
@@ -1722,7 +1721,7 @@
         <p:spPr bwMode="auto">
           <a:xfrm>
             <a:off x="381000" y="0"/>
-            <a:ext cx="609600" cy="6858000"/>
+            <a:ext cx="609600" cy="5143500"/>
           </a:xfrm>
           <a:prstGeom prst="rect">
             <a:avLst/>
@@ -1771,7 +1770,7 @@
         <p:spPr bwMode="auto">
           <a:xfrm>
             <a:off x="276336" y="0"/>
-            <a:ext cx="104664" cy="6858000"/>
+            <a:ext cx="104664" cy="5143500"/>
           </a:xfrm>
           <a:prstGeom prst="rect">
             <a:avLst/>
@@ -1820,7 +1819,7 @@
         <p:spPr bwMode="auto">
           <a:xfrm>
             <a:off x="990600" y="0"/>
-            <a:ext cx="181872" cy="6858000"/>
+            <a:ext cx="181872" cy="5143500"/>
           </a:xfrm>
           <a:prstGeom prst="rect">
             <a:avLst/>
@@ -1869,7 +1868,7 @@
         <p:spPr bwMode="auto">
           <a:xfrm>
             <a:off x="1141320" y="0"/>
-            <a:ext cx="230280" cy="6858000"/>
+            <a:ext cx="230280" cy="5143500"/>
           </a:xfrm>
           <a:prstGeom prst="rect">
             <a:avLst/>
@@ -1920,7 +1919,7 @@
         <p:spPr bwMode="auto">
           <a:xfrm>
             <a:off x="106344" y="0"/>
-            <a:ext cx="0" cy="6858000"/>
+            <a:ext cx="0" cy="5143500"/>
           </a:xfrm>
           <a:prstGeom prst="line">
             <a:avLst/>
@@ -1959,7 +1958,7 @@
         <p:spPr bwMode="auto">
           <a:xfrm>
             <a:off x="914400" y="0"/>
-            <a:ext cx="0" cy="6858000"/>
+            <a:ext cx="0" cy="5143500"/>
           </a:xfrm>
           <a:prstGeom prst="line">
             <a:avLst/>
@@ -1998,7 +1997,7 @@
         <p:spPr bwMode="auto">
           <a:xfrm>
             <a:off x="854112" y="0"/>
-            <a:ext cx="0" cy="6858000"/>
+            <a:ext cx="0" cy="5143500"/>
           </a:xfrm>
           <a:prstGeom prst="line">
             <a:avLst/>
@@ -2036,7 +2035,7 @@
         <p:spPr bwMode="auto">
           <a:xfrm>
             <a:off x="1726640" y="0"/>
-            <a:ext cx="0" cy="6858000"/>
+            <a:ext cx="0" cy="5143500"/>
           </a:xfrm>
           <a:prstGeom prst="line">
             <a:avLst/>
@@ -2075,7 +2074,7 @@
         <p:spPr bwMode="auto">
           <a:xfrm>
             <a:off x="1066800" y="0"/>
-            <a:ext cx="0" cy="6858000"/>
+            <a:ext cx="0" cy="5143500"/>
           </a:xfrm>
           <a:prstGeom prst="line">
             <a:avLst/>
@@ -2111,7 +2110,7 @@
         <p:spPr bwMode="auto">
           <a:xfrm>
             <a:off x="1219200" y="0"/>
-            <a:ext cx="76200" cy="6858000"/>
+            <a:ext cx="76200" cy="5143500"/>
           </a:xfrm>
           <a:prstGeom prst="rect">
             <a:avLst/>
@@ -2159,8 +2158,8 @@
         </p:nvSpPr>
         <p:spPr bwMode="auto">
           <a:xfrm>
-            <a:off x="609600" y="3429000"/>
-            <a:ext cx="1295400" cy="1295400"/>
+            <a:off x="609600" y="2571750"/>
+            <a:ext cx="1295400" cy="971550"/>
           </a:xfrm>
           <a:prstGeom prst="ellipse">
             <a:avLst/>
@@ -2202,8 +2201,8 @@
         </p:nvSpPr>
         <p:spPr bwMode="auto">
           <a:xfrm>
-            <a:off x="1324704" y="4866752"/>
-            <a:ext cx="641424" cy="641424"/>
+            <a:off x="1324704" y="3650064"/>
+            <a:ext cx="641424" cy="481068"/>
           </a:xfrm>
           <a:prstGeom prst="ellipse">
             <a:avLst/>
@@ -2245,8 +2244,8 @@
         </p:nvSpPr>
         <p:spPr bwMode="auto">
           <a:xfrm>
-            <a:off x="1091080" y="5500632"/>
-            <a:ext cx="137160" cy="137160"/>
+            <a:off x="1091080" y="4125474"/>
+            <a:ext cx="137160" cy="102870"/>
           </a:xfrm>
           <a:prstGeom prst="ellipse">
             <a:avLst/>
@@ -2288,8 +2287,8 @@
         </p:nvSpPr>
         <p:spPr bwMode="auto">
           <a:xfrm>
-            <a:off x="1664208" y="5791200"/>
-            <a:ext cx="274320" cy="274320"/>
+            <a:off x="1664208" y="4343400"/>
+            <a:ext cx="274320" cy="205740"/>
           </a:xfrm>
           <a:prstGeom prst="ellipse">
             <a:avLst/>
@@ -2331,8 +2330,8 @@
         </p:nvSpPr>
         <p:spPr bwMode="auto">
           <a:xfrm>
-            <a:off x="1879040" y="4479888"/>
-            <a:ext cx="365760" cy="365760"/>
+            <a:off x="1879040" y="3359916"/>
+            <a:ext cx="365760" cy="274320"/>
           </a:xfrm>
           <a:prstGeom prst="ellipse">
             <a:avLst/>
@@ -2377,7 +2376,7 @@
         <p:spPr bwMode="auto">
           <a:xfrm>
             <a:off x="9097944" y="0"/>
-            <a:ext cx="0" cy="6858000"/>
+            <a:ext cx="0" cy="5143500"/>
           </a:xfrm>
           <a:prstGeom prst="line">
             <a:avLst/>
@@ -2416,8 +2415,8 @@
         </p:nvSpPr>
         <p:spPr bwMode="auto">
           <a:xfrm>
-            <a:off x="1340616" y="4928702"/>
-            <a:ext cx="609600" cy="517524"/>
+            <a:off x="1340616" y="3696527"/>
+            <a:ext cx="609600" cy="388143"/>
           </a:xfrm>
         </p:spPr>
         <p:txBody>
@@ -2499,7 +2498,7 @@
             <a:fld id="{74BC4726-2204-402F-8651-3DE2807316DF}" type="datetimeFigureOut">
               <a:rPr lang="en-US" smtClean="0"/>
               <a:pPr/>
-              <a:t>6/1/2018</a:t>
+              <a:t>7/13/2019</a:t>
             </a:fld>
             <a:endParaRPr lang="en-US"/>
           </a:p>
@@ -2560,8 +2559,8 @@
         </p:nvSpPr>
         <p:spPr>
           <a:xfrm>
-            <a:off x="457200" y="1600200"/>
-            <a:ext cx="3657600" cy="4572000"/>
+            <a:off x="457200" y="1200150"/>
+            <a:ext cx="3657600" cy="3429000"/>
           </a:xfrm>
         </p:spPr>
         <p:txBody>
@@ -2617,8 +2616,8 @@
         </p:nvSpPr>
         <p:spPr>
           <a:xfrm>
-            <a:off x="4270248" y="1600200"/>
-            <a:ext cx="3657600" cy="4572000"/>
+            <a:off x="4270248" y="1200150"/>
+            <a:ext cx="3657600" cy="3429000"/>
           </a:xfrm>
         </p:spPr>
         <p:txBody>
@@ -2699,8 +2698,8 @@
         </p:nvSpPr>
         <p:spPr>
           <a:xfrm>
-            <a:off x="457200" y="273050"/>
-            <a:ext cx="7543800" cy="1143000"/>
+            <a:off x="457200" y="204788"/>
+            <a:ext cx="7543800" cy="857250"/>
           </a:xfrm>
         </p:spPr>
         <p:txBody>
@@ -2737,7 +2736,7 @@
             <a:fld id="{74BC4726-2204-402F-8651-3DE2807316DF}" type="datetimeFigureOut">
               <a:rPr lang="en-US" smtClean="0"/>
               <a:pPr/>
-              <a:t>6/1/2018</a:t>
+              <a:t>7/13/2019</a:t>
             </a:fld>
             <a:endParaRPr lang="en-US"/>
           </a:p>
@@ -2798,8 +2797,8 @@
         </p:nvSpPr>
         <p:spPr>
           <a:xfrm>
-            <a:off x="457200" y="2362200"/>
-            <a:ext cx="3657600" cy="3886200"/>
+            <a:off x="457200" y="1771650"/>
+            <a:ext cx="3657600" cy="2914650"/>
           </a:xfrm>
         </p:spPr>
         <p:txBody>
@@ -2855,8 +2854,8 @@
         </p:nvSpPr>
         <p:spPr>
           <a:xfrm>
-            <a:off x="4371975" y="2362200"/>
-            <a:ext cx="3657600" cy="3886200"/>
+            <a:off x="4371975" y="1771650"/>
+            <a:ext cx="3657600" cy="2914650"/>
           </a:xfrm>
         </p:spPr>
         <p:txBody>
@@ -2912,8 +2911,8 @@
         </p:nvSpPr>
         <p:spPr>
           <a:xfrm>
-            <a:off x="457200" y="1569720"/>
-            <a:ext cx="3657600" cy="658368"/>
+            <a:off x="457200" y="1177290"/>
+            <a:ext cx="3657600" cy="493776"/>
           </a:xfrm>
           <a:prstGeom prst="roundRect">
             <a:avLst>
@@ -2960,8 +2959,8 @@
         </p:nvSpPr>
         <p:spPr>
           <a:xfrm>
-            <a:off x="4343400" y="1569720"/>
-            <a:ext cx="3657600" cy="658368"/>
+            <a:off x="4343400" y="1177290"/>
+            <a:ext cx="3657600" cy="493776"/>
           </a:xfrm>
           <a:prstGeom prst="roundRect">
             <a:avLst>
@@ -3062,7 +3061,7 @@
             <a:fld id="{74BC4726-2204-402F-8651-3DE2807316DF}" type="datetimeFigureOut">
               <a:rPr lang="en-US" smtClean="0"/>
               <a:pPr/>
-              <a:t>6/1/2018</a:t>
+              <a:t>7/13/2019</a:t>
             </a:fld>
             <a:endParaRPr lang="en-US"/>
           </a:p>
@@ -3154,7 +3153,7 @@
             <a:fld id="{74BC4726-2204-402F-8651-3DE2807316DF}" type="datetimeFigureOut">
               <a:rPr lang="en-US" smtClean="0"/>
               <a:pPr/>
-              <a:t>6/1/2018</a:t>
+              <a:t>7/13/2019</a:t>
             </a:fld>
             <a:endParaRPr lang="en-US"/>
           </a:p>
@@ -3244,7 +3243,7 @@
         <p:spPr bwMode="auto">
           <a:xfrm>
             <a:off x="8763000" y="0"/>
-            <a:ext cx="0" cy="6858000"/>
+            <a:ext cx="0" cy="5143500"/>
           </a:xfrm>
           <a:prstGeom prst="line">
             <a:avLst/>
@@ -3284,8 +3283,8 @@
         </p:nvSpPr>
         <p:spPr>
           <a:xfrm rot="5400000">
-            <a:off x="3371850" y="3200400"/>
-            <a:ext cx="6309360" cy="457200"/>
+            <a:off x="4160520" y="2343150"/>
+            <a:ext cx="4732020" cy="457200"/>
           </a:xfrm>
         </p:spPr>
         <p:txBody>
@@ -3317,8 +3316,8 @@
         </p:nvSpPr>
         <p:spPr>
           <a:xfrm>
-            <a:off x="6812280" y="274320"/>
-            <a:ext cx="1527048" cy="4983480"/>
+            <a:off x="6812280" y="205740"/>
+            <a:ext cx="1527048" cy="3737610"/>
           </a:xfrm>
         </p:spPr>
         <p:txBody>
@@ -3371,7 +3370,7 @@
         <p:spPr bwMode="auto">
           <a:xfrm>
             <a:off x="6248400" y="0"/>
-            <a:ext cx="0" cy="6858000"/>
+            <a:ext cx="0" cy="5143500"/>
           </a:xfrm>
           <a:prstGeom prst="line">
             <a:avLst/>
@@ -3409,7 +3408,7 @@
         <p:spPr bwMode="auto">
           <a:xfrm>
             <a:off x="6192296" y="0"/>
-            <a:ext cx="0" cy="6858000"/>
+            <a:ext cx="0" cy="5143500"/>
           </a:xfrm>
           <a:prstGeom prst="line">
             <a:avLst/>
@@ -3445,7 +3444,7 @@
         <p:spPr bwMode="auto">
           <a:xfrm>
             <a:off x="8991600" y="0"/>
-            <a:ext cx="0" cy="6858000"/>
+            <a:ext cx="0" cy="5143500"/>
           </a:xfrm>
           <a:prstGeom prst="line">
             <a:avLst/>
@@ -3479,7 +3478,7 @@
         <p:spPr bwMode="auto">
           <a:xfrm>
             <a:off x="8839200" y="0"/>
-            <a:ext cx="304800" cy="6858000"/>
+            <a:ext cx="304800" cy="5143500"/>
           </a:xfrm>
           <a:prstGeom prst="rect">
             <a:avLst/>
@@ -3530,7 +3529,7 @@
         <p:spPr bwMode="auto">
           <a:xfrm>
             <a:off x="8915400" y="0"/>
-            <a:ext cx="0" cy="6858000"/>
+            <a:ext cx="0" cy="5143500"/>
           </a:xfrm>
           <a:prstGeom prst="line">
             <a:avLst/>
@@ -3563,8 +3562,8 @@
         </p:nvSpPr>
         <p:spPr>
           <a:xfrm>
-            <a:off x="8156448" y="5715000"/>
-            <a:ext cx="548640" cy="548640"/>
+            <a:off x="8156448" y="4286250"/>
+            <a:ext cx="548640" cy="411480"/>
           </a:xfrm>
           <a:prstGeom prst="ellipse">
             <a:avLst/>
@@ -3610,8 +3609,8 @@
         </p:nvSpPr>
         <p:spPr>
           <a:xfrm>
-            <a:off x="304800" y="274320"/>
-            <a:ext cx="5638800" cy="6327648"/>
+            <a:off x="304800" y="205740"/>
+            <a:ext cx="5638800" cy="4745736"/>
           </a:xfrm>
         </p:spPr>
         <p:txBody>
@@ -3673,7 +3672,7 @@
             <a:fld id="{74BC4726-2204-402F-8651-3DE2807316DF}" type="datetimeFigureOut">
               <a:rPr lang="en-US" smtClean="0"/>
               <a:pPr/>
-              <a:t>6/1/2018</a:t>
+              <a:t>7/13/2019</a:t>
             </a:fld>
             <a:endParaRPr lang="en-US"/>
           </a:p>
@@ -3758,7 +3757,7 @@
         <p:spPr bwMode="auto">
           <a:xfrm>
             <a:off x="8763000" y="0"/>
-            <a:ext cx="0" cy="6858000"/>
+            <a:ext cx="0" cy="5143500"/>
           </a:xfrm>
           <a:prstGeom prst="line">
             <a:avLst/>
@@ -3793,8 +3792,8 @@
         </p:nvSpPr>
         <p:spPr>
           <a:xfrm>
-            <a:off x="8156448" y="5715000"/>
-            <a:ext cx="548640" cy="548640"/>
+            <a:off x="8156448" y="4286250"/>
+            <a:ext cx="548640" cy="411480"/>
           </a:xfrm>
           <a:prstGeom prst="ellipse">
             <a:avLst/>
@@ -3840,8 +3839,8 @@
         </p:nvSpPr>
         <p:spPr>
           <a:xfrm rot="5400000">
-            <a:off x="3350133" y="3200400"/>
-            <a:ext cx="6309360" cy="457200"/>
+            <a:off x="4138803" y="2343150"/>
+            <a:ext cx="4732020" cy="457200"/>
           </a:xfrm>
         </p:spPr>
         <p:txBody>
@@ -3874,7 +3873,7 @@
         <p:spPr>
           <a:xfrm>
             <a:off x="0" y="0"/>
-            <a:ext cx="6172200" cy="6858000"/>
+            <a:ext cx="6172200" cy="5143500"/>
           </a:xfrm>
           <a:solidFill>
             <a:schemeClr val="bg2"/>
@@ -3932,8 +3931,8 @@
         </p:nvSpPr>
         <p:spPr>
           <a:xfrm>
-            <a:off x="6765798" y="264795"/>
-            <a:ext cx="1524000" cy="4956048"/>
+            <a:off x="6765798" y="198596"/>
+            <a:ext cx="1524000" cy="3717036"/>
           </a:xfrm>
         </p:spPr>
         <p:txBody>
@@ -3985,7 +3984,7 @@
         <p:spPr bwMode="auto">
           <a:xfrm>
             <a:off x="8991600" y="0"/>
-            <a:ext cx="0" cy="6858000"/>
+            <a:ext cx="0" cy="5143500"/>
           </a:xfrm>
           <a:prstGeom prst="line">
             <a:avLst/>
@@ -4019,7 +4018,7 @@
         <p:spPr bwMode="auto">
           <a:xfrm>
             <a:off x="8839200" y="0"/>
-            <a:ext cx="304800" cy="6858000"/>
+            <a:ext cx="304800" cy="5143500"/>
           </a:xfrm>
           <a:prstGeom prst="rect">
             <a:avLst/>
@@ -4069,7 +4068,7 @@
         <p:spPr bwMode="auto">
           <a:xfrm>
             <a:off x="8915400" y="0"/>
-            <a:ext cx="0" cy="6858000"/>
+            <a:ext cx="0" cy="5143500"/>
           </a:xfrm>
           <a:prstGeom prst="line">
             <a:avLst/>
@@ -4105,7 +4104,7 @@
         <p:spPr bwMode="auto">
           <a:xfrm>
             <a:off x="6248400" y="0"/>
-            <a:ext cx="0" cy="6858000"/>
+            <a:ext cx="0" cy="5143500"/>
           </a:xfrm>
           <a:prstGeom prst="line">
             <a:avLst/>
@@ -4143,7 +4142,7 @@
         <p:spPr bwMode="auto">
           <a:xfrm>
             <a:off x="6192296" y="0"/>
-            <a:ext cx="0" cy="6858000"/>
+            <a:ext cx="0" cy="5143500"/>
           </a:xfrm>
           <a:prstGeom prst="line">
             <a:avLst/>
@@ -4186,7 +4185,7 @@
             <a:fld id="{74BC4726-2204-402F-8651-3DE2807316DF}" type="datetimeFigureOut">
               <a:rPr lang="en-US" smtClean="0"/>
               <a:pPr/>
-              <a:t>6/1/2018</a:t>
+              <a:t>7/13/2019</a:t>
             </a:fld>
             <a:endParaRPr lang="en-US"/>
           </a:p>
@@ -4276,7 +4275,7 @@
         <p:spPr bwMode="auto">
           <a:xfrm>
             <a:off x="8763000" y="0"/>
-            <a:ext cx="0" cy="6858000"/>
+            <a:ext cx="0" cy="5143500"/>
           </a:xfrm>
           <a:prstGeom prst="line">
             <a:avLst/>
@@ -4316,8 +4315,8 @@
         </p:nvSpPr>
         <p:spPr>
           <a:xfrm>
-            <a:off x="457200" y="274638"/>
-            <a:ext cx="7467600" cy="1143000"/>
+            <a:off x="457200" y="205979"/>
+            <a:ext cx="7467600" cy="857250"/>
           </a:xfrm>
           <a:prstGeom prst="rect">
             <a:avLst/>
@@ -4349,8 +4348,8 @@
         </p:nvSpPr>
         <p:spPr>
           <a:xfrm>
-            <a:off x="457200" y="1600200"/>
-            <a:ext cx="7467600" cy="4873752"/>
+            <a:off x="457200" y="1200150"/>
+            <a:ext cx="7467600" cy="3655314"/>
           </a:xfrm>
           <a:prstGeom prst="rect">
             <a:avLst/>
@@ -4411,8 +4410,8 @@
         </p:nvSpPr>
         <p:spPr>
           <a:xfrm rot="5400000">
-            <a:off x="7589520" y="1081851"/>
-            <a:ext cx="2011680" cy="384048"/>
+            <a:off x="7840980" y="763382"/>
+            <a:ext cx="1508760" cy="384048"/>
           </a:xfrm>
           <a:prstGeom prst="rect">
             <a:avLst/>
@@ -4433,7 +4432,7 @@
             <a:fld id="{74BC4726-2204-402F-8651-3DE2807316DF}" type="datetimeFigureOut">
               <a:rPr lang="en-US" smtClean="0"/>
               <a:pPr/>
-              <a:t>6/1/2018</a:t>
+              <a:t>7/13/2019</a:t>
             </a:fld>
             <a:endParaRPr lang="en-US"/>
           </a:p>
@@ -4451,8 +4450,8 @@
         </p:nvSpPr>
         <p:spPr>
           <a:xfrm rot="5400000">
-            <a:off x="6990186" y="3737240"/>
-            <a:ext cx="3200400" cy="365760"/>
+            <a:off x="7390236" y="2757210"/>
+            <a:ext cx="2400300" cy="365760"/>
           </a:xfrm>
           <a:prstGeom prst="rect">
             <a:avLst/>
@@ -4485,7 +4484,7 @@
         <p:spPr bwMode="auto">
           <a:xfrm>
             <a:off x="76200" y="0"/>
-            <a:ext cx="0" cy="6858000"/>
+            <a:ext cx="0" cy="5143500"/>
           </a:xfrm>
           <a:prstGeom prst="line">
             <a:avLst/>
@@ -4523,7 +4522,7 @@
         <p:spPr bwMode="auto">
           <a:xfrm>
             <a:off x="8991600" y="0"/>
-            <a:ext cx="0" cy="6858000"/>
+            <a:ext cx="0" cy="5143500"/>
           </a:xfrm>
           <a:prstGeom prst="line">
             <a:avLst/>
@@ -4557,7 +4556,7 @@
         <p:spPr bwMode="auto">
           <a:xfrm>
             <a:off x="8839200" y="0"/>
-            <a:ext cx="304800" cy="6858000"/>
+            <a:ext cx="304800" cy="5143500"/>
           </a:xfrm>
           <a:prstGeom prst="rect">
             <a:avLst/>
@@ -4608,7 +4607,7 @@
         <p:spPr bwMode="auto">
           <a:xfrm>
             <a:off x="8915400" y="0"/>
-            <a:ext cx="0" cy="6858000"/>
+            <a:ext cx="0" cy="5143500"/>
           </a:xfrm>
           <a:prstGeom prst="line">
             <a:avLst/>
@@ -4641,8 +4640,8 @@
         </p:nvSpPr>
         <p:spPr>
           <a:xfrm>
-            <a:off x="8156448" y="5715000"/>
-            <a:ext cx="548640" cy="548640"/>
+            <a:off x="8156448" y="4286250"/>
+            <a:ext cx="548640" cy="411480"/>
           </a:xfrm>
           <a:prstGeom prst="ellipse">
             <a:avLst/>
@@ -4688,8 +4687,8 @@
         </p:nvSpPr>
         <p:spPr>
           <a:xfrm>
-            <a:off x="8129016" y="5734050"/>
-            <a:ext cx="609600" cy="521208"/>
+            <a:off x="8129016" y="4300538"/>
+            <a:ext cx="609600" cy="390906"/>
           </a:xfrm>
           <a:prstGeom prst="rect">
             <a:avLst/>
@@ -5052,7 +5051,7 @@
         <p:spPr/>
         <p:txBody>
           <a:bodyPr>
-            <a:normAutofit/>
+            <a:normAutofit fontScale="90000"/>
           </a:bodyPr>
           <a:lstStyle/>
           <a:p>
@@ -5170,7 +5169,7 @@
         <p:spPr>
           <a:xfrm>
             <a:off x="0" y="0"/>
-            <a:ext cx="9144000" cy="6858000"/>
+            <a:ext cx="9144000" cy="5143500"/>
           </a:xfrm>
         </p:spPr>
         <p:txBody>
@@ -5180,14 +5179,14 @@
           <a:lstStyle/>
           <a:p>
             <a:r>
-              <a:rPr lang="zh-TW" altLang="en-US" sz="6000" dirty="0" smtClean="0">
+              <a:rPr lang="zh-TW" altLang="en-US" sz="4400" dirty="0" smtClean="0">
                 <a:latin typeface="微軟正黑體" pitchFamily="34" charset="-120"/>
                 <a:ea typeface="微軟正黑體" pitchFamily="34" charset="-120"/>
               </a:rPr>
               <a:t>信就是所望之事的實底，是未見之事的確據。古人在這信上得了美好的證據。</a:t>
             </a:r>
             <a:r>
-              <a:rPr lang="en-US" altLang="zh-TW" sz="6000" dirty="0" smtClean="0">
+              <a:rPr lang="en-US" altLang="zh-TW" sz="4400" dirty="0" smtClean="0">
                 <a:latin typeface="微軟正黑體" pitchFamily="34" charset="-120"/>
                 <a:ea typeface="微軟正黑體" pitchFamily="34" charset="-120"/>
               </a:rPr>
@@ -5196,14 +5195,14 @@
           </a:p>
           <a:p>
             <a:r>
-              <a:rPr lang="zh-TW" altLang="en-US" sz="6000" b="1" dirty="0" smtClean="0">
+              <a:rPr lang="zh-TW" altLang="en-US" sz="4400" b="1" dirty="0" smtClean="0">
                 <a:latin typeface="微軟正黑體" pitchFamily="34" charset="-120"/>
                 <a:ea typeface="微軟正黑體" pitchFamily="34" charset="-120"/>
               </a:rPr>
               <a:t>我們因著信，就知道諸世界是藉神話造成的；這樣，所看見的，並不是從顯然之物造出來的。</a:t>
             </a:r>
             <a:r>
-              <a:rPr lang="en-US" altLang="zh-TW" sz="6000" b="1" dirty="0" smtClean="0">
+              <a:rPr lang="en-US" altLang="zh-TW" sz="4400" b="1" dirty="0" smtClean="0">
                 <a:latin typeface="微軟正黑體" pitchFamily="34" charset="-120"/>
                 <a:ea typeface="微軟正黑體" pitchFamily="34" charset="-120"/>
               </a:rPr>
@@ -5250,7 +5249,7 @@
         <p:spPr>
           <a:xfrm>
             <a:off x="0" y="0"/>
-            <a:ext cx="9144000" cy="6858000"/>
+            <a:ext cx="9144000" cy="5143500"/>
           </a:xfrm>
         </p:spPr>
         <p:txBody>
@@ -5260,19 +5259,30 @@
           <a:lstStyle/>
           <a:p>
             <a:r>
-              <a:rPr lang="zh-TW" altLang="en-US" sz="6000" dirty="0" smtClean="0">
+              <a:rPr lang="zh-TW" altLang="en-US" sz="4400" dirty="0" smtClean="0">
                 <a:latin typeface="微軟正黑體" pitchFamily="34" charset="-120"/>
                 <a:ea typeface="微軟正黑體" pitchFamily="34" charset="-120"/>
               </a:rPr>
-              <a:t>亞伯因著信，獻祭與神，比該隱所獻的更美，因此便得了稱義的見證，就是神指他禮物作的見證。他雖然死了，卻因這信，仍舊說話。</a:t>
-            </a:r>
-            <a:r>
-              <a:rPr lang="en-US" altLang="zh-TW" sz="6000" dirty="0" smtClean="0">
+              <a:t>亞伯因著信，獻祭與神，比該隱所獻的更美，因此便得了稱義的見證，就是神指他禮物作的見證。他雖然死了，卻因這信，仍舊說話</a:t>
+            </a:r>
+            <a:r>
+              <a:rPr lang="zh-TW" altLang="en-US" sz="4400" dirty="0" smtClean="0">
+                <a:latin typeface="微軟正黑體" pitchFamily="34" charset="-120"/>
+                <a:ea typeface="微軟正黑體" pitchFamily="34" charset="-120"/>
+              </a:rPr>
+              <a:t>。</a:t>
+            </a:r>
+            <a:r>
+              <a:rPr lang="en-US" altLang="zh-TW" sz="4400" dirty="0" smtClean="0">
                 <a:latin typeface="微軟正黑體" pitchFamily="34" charset="-120"/>
                 <a:ea typeface="微軟正黑體" pitchFamily="34" charset="-120"/>
               </a:rPr>
               <a:t> </a:t>
             </a:r>
+            <a:endParaRPr lang="en-US" altLang="zh-TW" sz="4400" dirty="0" smtClean="0">
+              <a:latin typeface="微軟正黑體" pitchFamily="34" charset="-120"/>
+              <a:ea typeface="微軟正黑體" pitchFamily="34" charset="-120"/>
+            </a:endParaRPr>
           </a:p>
         </p:txBody>
       </p:sp>
@@ -5314,7 +5324,7 @@
         <p:spPr>
           <a:xfrm>
             <a:off x="0" y="0"/>
-            <a:ext cx="9144000" cy="6858000"/>
+            <a:ext cx="9144000" cy="5143500"/>
           </a:xfrm>
         </p:spPr>
         <p:txBody>
@@ -5324,14 +5334,30 @@
           <a:lstStyle/>
           <a:p>
             <a:r>
-              <a:rPr lang="zh-TW" altLang="en-US" sz="6000" b="1" dirty="0" smtClean="0">
+              <a:rPr lang="zh-TW" altLang="en-US" sz="4400" b="1" dirty="0" smtClean="0">
                 <a:latin typeface="微軟正黑體" pitchFamily="34" charset="-120"/>
                 <a:ea typeface="微軟正黑體" pitchFamily="34" charset="-120"/>
               </a:rPr>
               <a:t>以諾因著信，被接去，不至於見死，人也找不著他，因為神已經把他接去了；只是他被接去以先，已經得了神喜悅他的明證。</a:t>
             </a:r>
             <a:r>
-              <a:rPr lang="en-US" altLang="zh-TW" sz="6000" b="1" dirty="0" smtClean="0">
+              <a:rPr lang="en-US" altLang="zh-TW" sz="4400" b="1" dirty="0" smtClean="0">
+                <a:latin typeface="微軟正黑體" pitchFamily="34" charset="-120"/>
+                <a:ea typeface="微軟正黑體" pitchFamily="34" charset="-120"/>
+              </a:rPr>
+              <a:t> </a:t>
+            </a:r>
+          </a:p>
+          <a:p>
+            <a:r>
+              <a:rPr lang="zh-TW" altLang="en-US" sz="4400" dirty="0">
+                <a:latin typeface="微軟正黑體" pitchFamily="34" charset="-120"/>
+                <a:ea typeface="微軟正黑體" pitchFamily="34" charset="-120"/>
+              </a:rPr>
+              <a:t>人非有信，就不能得神的喜悅；因為到神面前來的人必須信有神，且信他賞賜那尋求他的人。</a:t>
+            </a:r>
+            <a:r>
+              <a:rPr lang="en-US" altLang="zh-TW" sz="4400" dirty="0">
                 <a:latin typeface="微軟正黑體" pitchFamily="34" charset="-120"/>
                 <a:ea typeface="微軟正黑體" pitchFamily="34" charset="-120"/>
               </a:rPr>
@@ -5378,7 +5404,7 @@
         <p:spPr>
           <a:xfrm>
             <a:off x="0" y="0"/>
-            <a:ext cx="9144000" cy="6858000"/>
+            <a:ext cx="9144000" cy="5143500"/>
           </a:xfrm>
         </p:spPr>
         <p:txBody>
@@ -5388,14 +5414,14 @@
           <a:lstStyle/>
           <a:p>
             <a:r>
-              <a:rPr lang="zh-TW" altLang="en-US" sz="6000" dirty="0" smtClean="0">
+              <a:rPr lang="zh-TW" altLang="en-US" sz="4400" b="1" dirty="0" smtClean="0">
                 <a:latin typeface="微軟正黑體" pitchFamily="34" charset="-120"/>
                 <a:ea typeface="微軟正黑體" pitchFamily="34" charset="-120"/>
               </a:rPr>
-              <a:t>人非有信，就不能得神的喜悅；因為到神面前來的人必須信有神，且信他賞賜那尋求他的人。</a:t>
-            </a:r>
-            <a:r>
-              <a:rPr lang="en-US" altLang="zh-TW" sz="6000" dirty="0" smtClean="0">
+              <a:t>挪亞因著信，既蒙神指示他未見的事，動了敬畏的心，預備了一隻方舟，使他全家得救。因此就定了那世代的罪，自己也承受了那從信而來的義。</a:t>
+            </a:r>
+            <a:r>
+              <a:rPr lang="en-US" altLang="zh-TW" sz="4400" b="1" dirty="0" smtClean="0">
                 <a:latin typeface="微軟正黑體" pitchFamily="34" charset="-120"/>
                 <a:ea typeface="微軟正黑體" pitchFamily="34" charset="-120"/>
               </a:rPr>
@@ -5442,7 +5468,7 @@
         <p:spPr>
           <a:xfrm>
             <a:off x="0" y="0"/>
-            <a:ext cx="9144000" cy="6858000"/>
+            <a:ext cx="9144000" cy="5143500"/>
           </a:xfrm>
         </p:spPr>
         <p:txBody>
@@ -5452,94 +5478,30 @@
           <a:lstStyle/>
           <a:p>
             <a:r>
-              <a:rPr lang="zh-TW" altLang="en-US" sz="6000" b="1" dirty="0" smtClean="0">
+              <a:rPr lang="zh-TW" altLang="en-US" sz="4400" dirty="0" smtClean="0">
                 <a:latin typeface="微軟正黑體" pitchFamily="34" charset="-120"/>
                 <a:ea typeface="微軟正黑體" pitchFamily="34" charset="-120"/>
               </a:rPr>
-              <a:t>挪亞因著信，既蒙神指示他未見的事，動了敬畏的心，預備了一隻方舟，使他全家得救。因此就定了那世代的罪，自己也承受了那從信而來的義。</a:t>
-            </a:r>
-            <a:r>
-              <a:rPr lang="en-US" altLang="zh-TW" sz="6000" b="1" dirty="0" smtClean="0">
+              <a:t>這些人都是因信得了美好的證據，卻仍未得著所應許的；</a:t>
+            </a:r>
+            <a:r>
+              <a:rPr lang="en-US" altLang="zh-TW" sz="4400" dirty="0" smtClean="0">
                 <a:latin typeface="微軟正黑體" pitchFamily="34" charset="-120"/>
                 <a:ea typeface="微軟正黑體" pitchFamily="34" charset="-120"/>
               </a:rPr>
               <a:t> </a:t>
             </a:r>
           </a:p>
-        </p:txBody>
-      </p:sp>
-    </p:spTree>
-  </p:cSld>
-  <p:clrMapOvr>
-    <a:masterClrMapping/>
-  </p:clrMapOvr>
-</p:sld>
-</file>
-
-<file path=ppt/slides/slide7.xml><?xml version="1.0" encoding="utf-8"?>
-<p:sld xmlns:a="http://schemas.openxmlformats.org/drawingml/2006/main" xmlns:r="http://schemas.openxmlformats.org/officeDocument/2006/relationships" xmlns:p="http://schemas.openxmlformats.org/presentationml/2006/main">
-  <p:cSld>
-    <p:spTree>
-      <p:nvGrpSpPr>
-        <p:cNvPr id="1" name=""/>
-        <p:cNvGrpSpPr/>
-        <p:nvPr/>
-      </p:nvGrpSpPr>
-      <p:grpSpPr>
-        <a:xfrm>
-          <a:off x="0" y="0"/>
-          <a:ext cx="0" cy="0"/>
-          <a:chOff x="0" y="0"/>
-          <a:chExt cx="0" cy="0"/>
-        </a:xfrm>
-      </p:grpSpPr>
-      <p:sp>
-        <p:nvSpPr>
-          <p:cNvPr id="3" name="Content Placeholder 2"/>
-          <p:cNvSpPr>
-            <a:spLocks noGrp="1"/>
-          </p:cNvSpPr>
-          <p:nvPr>
-            <p:ph sz="quarter" idx="1"/>
-          </p:nvPr>
-        </p:nvSpPr>
-        <p:spPr>
-          <a:xfrm>
-            <a:off x="0" y="0"/>
-            <a:ext cx="9144000" cy="6858000"/>
-          </a:xfrm>
-        </p:spPr>
-        <p:txBody>
-          <a:bodyPr>
-            <a:noAutofit/>
-          </a:bodyPr>
-          <a:lstStyle/>
-          <a:p>
-            <a:r>
-              <a:rPr lang="zh-TW" altLang="en-US" sz="6000" dirty="0" smtClean="0">
-                <a:latin typeface="微軟正黑體" pitchFamily="34" charset="-120"/>
-                <a:ea typeface="微軟正黑體" pitchFamily="34" charset="-120"/>
-              </a:rPr>
-              <a:t>這些人都是因信得了美好的證據，卻仍未得著所應許的；</a:t>
-            </a:r>
-            <a:r>
-              <a:rPr lang="en-US" altLang="zh-TW" sz="6000" dirty="0" smtClean="0">
-                <a:latin typeface="微軟正黑體" pitchFamily="34" charset="-120"/>
-                <a:ea typeface="微軟正黑體" pitchFamily="34" charset="-120"/>
-              </a:rPr>
-              <a:t> </a:t>
-            </a:r>
-          </a:p>
-          <a:p>
-            <a:r>
-              <a:rPr lang="zh-TW" altLang="en-US" sz="6000" b="1" dirty="0" smtClean="0">
+          <a:p>
+            <a:r>
+              <a:rPr lang="zh-TW" altLang="en-US" sz="4400" b="1" dirty="0" smtClean="0">
                 <a:latin typeface="微軟正黑體" pitchFamily="34" charset="-120"/>
                 <a:ea typeface="微軟正黑體" pitchFamily="34" charset="-120"/>
               </a:rPr>
               <a:t>因為神給我們預備了更美的事，叫他們若不與我們同得，就不能完全。</a:t>
             </a:r>
             <a:r>
-              <a:rPr lang="en-US" altLang="zh-TW" sz="6000" b="1" dirty="0" smtClean="0">
+              <a:rPr lang="en-US" altLang="zh-TW" sz="4400" b="1" dirty="0" smtClean="0">
                 <a:latin typeface="微軟正黑體" pitchFamily="34" charset="-120"/>
                 <a:ea typeface="微軟正黑體" pitchFamily="34" charset="-120"/>
               </a:rPr>

</xml_diff>